<commit_message>
add gpu for ad
</commit_message>
<xml_diff>
--- a/pic.pptx
+++ b/pic.pptx
@@ -9,6 +9,7 @@
     <p:sldId id="257" r:id="rId3"/>
     <p:sldId id="258" r:id="rId4"/>
     <p:sldId id="259" r:id="rId5"/>
+    <p:sldId id="260" r:id="rId6"/>
   </p:sldIdLst>
   <p:sldSz cx="12192000" cy="6858000"/>
   <p:notesSz cx="6858000" cy="9144000"/>
@@ -262,7 +263,7 @@
           <a:p>
             <a:fld id="{D46C8B5B-2B2E-4BF5-9128-B8D40BB24518}" type="datetimeFigureOut">
               <a:rPr lang="zh-CN" altLang="en-US" smtClean="0"/>
-              <a:t>2019/8/16</a:t>
+              <a:t>2019/9/14</a:t>
             </a:fld>
             <a:endParaRPr lang="zh-CN" altLang="en-US"/>
           </a:p>
@@ -460,7 +461,7 @@
           <a:p>
             <a:fld id="{D46C8B5B-2B2E-4BF5-9128-B8D40BB24518}" type="datetimeFigureOut">
               <a:rPr lang="zh-CN" altLang="en-US" smtClean="0"/>
-              <a:t>2019/8/16</a:t>
+              <a:t>2019/9/14</a:t>
             </a:fld>
             <a:endParaRPr lang="zh-CN" altLang="en-US"/>
           </a:p>
@@ -668,7 +669,7 @@
           <a:p>
             <a:fld id="{D46C8B5B-2B2E-4BF5-9128-B8D40BB24518}" type="datetimeFigureOut">
               <a:rPr lang="zh-CN" altLang="en-US" smtClean="0"/>
-              <a:t>2019/8/16</a:t>
+              <a:t>2019/9/14</a:t>
             </a:fld>
             <a:endParaRPr lang="zh-CN" altLang="en-US"/>
           </a:p>
@@ -866,7 +867,7 @@
           <a:p>
             <a:fld id="{D46C8B5B-2B2E-4BF5-9128-B8D40BB24518}" type="datetimeFigureOut">
               <a:rPr lang="zh-CN" altLang="en-US" smtClean="0"/>
-              <a:t>2019/8/16</a:t>
+              <a:t>2019/9/14</a:t>
             </a:fld>
             <a:endParaRPr lang="zh-CN" altLang="en-US"/>
           </a:p>
@@ -1141,7 +1142,7 @@
           <a:p>
             <a:fld id="{D46C8B5B-2B2E-4BF5-9128-B8D40BB24518}" type="datetimeFigureOut">
               <a:rPr lang="zh-CN" altLang="en-US" smtClean="0"/>
-              <a:t>2019/8/16</a:t>
+              <a:t>2019/9/14</a:t>
             </a:fld>
             <a:endParaRPr lang="zh-CN" altLang="en-US"/>
           </a:p>
@@ -1406,7 +1407,7 @@
           <a:p>
             <a:fld id="{D46C8B5B-2B2E-4BF5-9128-B8D40BB24518}" type="datetimeFigureOut">
               <a:rPr lang="zh-CN" altLang="en-US" smtClean="0"/>
-              <a:t>2019/8/16</a:t>
+              <a:t>2019/9/14</a:t>
             </a:fld>
             <a:endParaRPr lang="zh-CN" altLang="en-US"/>
           </a:p>
@@ -1818,7 +1819,7 @@
           <a:p>
             <a:fld id="{D46C8B5B-2B2E-4BF5-9128-B8D40BB24518}" type="datetimeFigureOut">
               <a:rPr lang="zh-CN" altLang="en-US" smtClean="0"/>
-              <a:t>2019/8/16</a:t>
+              <a:t>2019/9/14</a:t>
             </a:fld>
             <a:endParaRPr lang="zh-CN" altLang="en-US"/>
           </a:p>
@@ -1959,7 +1960,7 @@
           <a:p>
             <a:fld id="{D46C8B5B-2B2E-4BF5-9128-B8D40BB24518}" type="datetimeFigureOut">
               <a:rPr lang="zh-CN" altLang="en-US" smtClean="0"/>
-              <a:t>2019/8/16</a:t>
+              <a:t>2019/9/14</a:t>
             </a:fld>
             <a:endParaRPr lang="zh-CN" altLang="en-US"/>
           </a:p>
@@ -2072,7 +2073,7 @@
           <a:p>
             <a:fld id="{D46C8B5B-2B2E-4BF5-9128-B8D40BB24518}" type="datetimeFigureOut">
               <a:rPr lang="zh-CN" altLang="en-US" smtClean="0"/>
-              <a:t>2019/8/16</a:t>
+              <a:t>2019/9/14</a:t>
             </a:fld>
             <a:endParaRPr lang="zh-CN" altLang="en-US"/>
           </a:p>
@@ -2383,7 +2384,7 @@
           <a:p>
             <a:fld id="{D46C8B5B-2B2E-4BF5-9128-B8D40BB24518}" type="datetimeFigureOut">
               <a:rPr lang="zh-CN" altLang="en-US" smtClean="0"/>
-              <a:t>2019/8/16</a:t>
+              <a:t>2019/9/14</a:t>
             </a:fld>
             <a:endParaRPr lang="zh-CN" altLang="en-US"/>
           </a:p>
@@ -2671,7 +2672,7 @@
           <a:p>
             <a:fld id="{D46C8B5B-2B2E-4BF5-9128-B8D40BB24518}" type="datetimeFigureOut">
               <a:rPr lang="zh-CN" altLang="en-US" smtClean="0"/>
-              <a:t>2019/8/16</a:t>
+              <a:t>2019/9/14</a:t>
             </a:fld>
             <a:endParaRPr lang="zh-CN" altLang="en-US"/>
           </a:p>
@@ -2912,7 +2913,7 @@
           <a:p>
             <a:fld id="{D46C8B5B-2B2E-4BF5-9128-B8D40BB24518}" type="datetimeFigureOut">
               <a:rPr lang="zh-CN" altLang="en-US" smtClean="0"/>
-              <a:t>2019/8/16</a:t>
+              <a:t>2019/9/14</a:t>
             </a:fld>
             <a:endParaRPr lang="zh-CN" altLang="en-US"/>
           </a:p>
@@ -11788,10 +11789,10 @@
       </p:grpSpPr>
       <p:grpSp>
         <p:nvGrpSpPr>
-          <p:cNvPr id="24" name="组合 23">
+          <p:cNvPr id="2" name="组合 1">
             <a:extLst>
               <a:ext uri="{FF2B5EF4-FFF2-40B4-BE49-F238E27FC236}">
-                <a16:creationId xmlns:a16="http://schemas.microsoft.com/office/drawing/2014/main" id="{5688A659-F470-4515-83CE-A3CF34CB7507}"/>
+                <a16:creationId xmlns:a16="http://schemas.microsoft.com/office/drawing/2014/main" id="{0942C690-67B9-4366-AC86-EBAAF1EB4752}"/>
               </a:ext>
             </a:extLst>
           </p:cNvPr>
@@ -11800,10 +11801,10 @@
         </p:nvGrpSpPr>
         <p:grpSpPr>
           <a:xfrm>
-            <a:off x="619760" y="533399"/>
-            <a:ext cx="8036560" cy="5791201"/>
-            <a:chOff x="904240" y="924560"/>
-            <a:chExt cx="8036560" cy="5791201"/>
+            <a:off x="619760" y="944873"/>
+            <a:ext cx="8036560" cy="5379727"/>
+            <a:chOff x="619760" y="944873"/>
+            <a:chExt cx="8036560" cy="5379727"/>
           </a:xfrm>
         </p:grpSpPr>
         <p:sp>
@@ -11820,8 +11821,8 @@
           </p:nvSpPr>
           <p:spPr>
             <a:xfrm>
-              <a:off x="904240" y="924560"/>
-              <a:ext cx="8036560" cy="5791200"/>
+              <a:off x="619760" y="944873"/>
+              <a:ext cx="8036560" cy="5379726"/>
             </a:xfrm>
             <a:prstGeom prst="rect">
               <a:avLst/>
@@ -11874,8 +11875,8 @@
           </p:nvSpPr>
           <p:spPr>
             <a:xfrm>
-              <a:off x="8219440" y="924560"/>
-              <a:ext cx="711200" cy="5760720"/>
+              <a:off x="7934960" y="944873"/>
+              <a:ext cx="711200" cy="5349246"/>
             </a:xfrm>
             <a:prstGeom prst="downArrow">
               <a:avLst/>
@@ -11937,7 +11938,7 @@
           </p:nvSpPr>
           <p:spPr>
             <a:xfrm>
-              <a:off x="904240" y="924560"/>
+              <a:off x="619760" y="944873"/>
               <a:ext cx="7498080" cy="548640"/>
             </a:xfrm>
             <a:prstGeom prst="rect">
@@ -11998,8 +11999,8 @@
           </p:nvSpPr>
           <p:spPr>
             <a:xfrm>
-              <a:off x="904240" y="1650994"/>
-              <a:ext cx="711200" cy="1910080"/>
+              <a:off x="619760" y="1686560"/>
+              <a:ext cx="711200" cy="1595114"/>
             </a:xfrm>
             <a:prstGeom prst="rect">
               <a:avLst/>
@@ -12125,7 +12126,7 @@
           </p:nvSpPr>
           <p:spPr>
             <a:xfrm>
-              <a:off x="904240" y="3911591"/>
+              <a:off x="619760" y="3520430"/>
               <a:ext cx="711200" cy="2804170"/>
             </a:xfrm>
             <a:prstGeom prst="rect">
@@ -12241,7 +12242,7 @@
           </p:nvSpPr>
           <p:spPr>
             <a:xfrm>
-              <a:off x="1615440" y="5801360"/>
+              <a:off x="1330960" y="5410199"/>
               <a:ext cx="924560" cy="914400"/>
             </a:xfrm>
             <a:prstGeom prst="rect">
@@ -12304,7 +12305,7 @@
           </p:nvSpPr>
           <p:spPr>
             <a:xfrm>
-              <a:off x="2788920" y="6289040"/>
+              <a:off x="2504440" y="5897879"/>
               <a:ext cx="5217160" cy="426720"/>
             </a:xfrm>
             <a:prstGeom prst="rect">
@@ -12372,7 +12373,7 @@
           </p:nvSpPr>
           <p:spPr>
             <a:xfrm>
-              <a:off x="2788920" y="5801360"/>
+              <a:off x="2504440" y="5410199"/>
               <a:ext cx="5217160" cy="426720"/>
             </a:xfrm>
             <a:prstGeom prst="rect">
@@ -12440,7 +12441,7 @@
           </p:nvSpPr>
           <p:spPr>
             <a:xfrm>
-              <a:off x="1615440" y="5140957"/>
+              <a:off x="1330960" y="4749796"/>
               <a:ext cx="924560" cy="548641"/>
             </a:xfrm>
             <a:prstGeom prst="rect">
@@ -12519,7 +12520,7 @@
           </p:nvSpPr>
           <p:spPr>
             <a:xfrm>
-              <a:off x="2788920" y="5140956"/>
+              <a:off x="2504440" y="4749795"/>
               <a:ext cx="2570480" cy="548642"/>
             </a:xfrm>
             <a:prstGeom prst="rect">
@@ -12587,7 +12588,7 @@
           </p:nvSpPr>
           <p:spPr>
             <a:xfrm>
-              <a:off x="5435600" y="5140956"/>
+              <a:off x="5151120" y="4749795"/>
               <a:ext cx="2570480" cy="548642"/>
             </a:xfrm>
             <a:prstGeom prst="rect">
@@ -12655,7 +12656,7 @@
           </p:nvSpPr>
           <p:spPr>
             <a:xfrm>
-              <a:off x="1615440" y="4460234"/>
+              <a:off x="1330960" y="4069073"/>
               <a:ext cx="924560" cy="548641"/>
             </a:xfrm>
             <a:prstGeom prst="rect">
@@ -12718,7 +12719,7 @@
           </p:nvSpPr>
           <p:spPr>
             <a:xfrm>
-              <a:off x="1615440" y="3911592"/>
+              <a:off x="1330960" y="3520431"/>
               <a:ext cx="924560" cy="548641"/>
             </a:xfrm>
             <a:prstGeom prst="rect">
@@ -12781,7 +12782,7 @@
           </p:nvSpPr>
           <p:spPr>
             <a:xfrm>
-              <a:off x="2788920" y="4511033"/>
+              <a:off x="2504440" y="4119872"/>
               <a:ext cx="3957320" cy="548642"/>
             </a:xfrm>
             <a:prstGeom prst="rect">
@@ -12849,7 +12850,7 @@
           </p:nvSpPr>
           <p:spPr>
             <a:xfrm>
-              <a:off x="6832602" y="3962391"/>
+              <a:off x="6548122" y="3571230"/>
               <a:ext cx="1173478" cy="1097284"/>
             </a:xfrm>
             <a:prstGeom prst="rect">
@@ -12917,7 +12918,7 @@
           </p:nvSpPr>
           <p:spPr>
             <a:xfrm>
-              <a:off x="2794002" y="3962390"/>
+              <a:off x="2509522" y="3571229"/>
               <a:ext cx="1295400" cy="548642"/>
             </a:xfrm>
             <a:prstGeom prst="rect">
@@ -12985,7 +12986,7 @@
           </p:nvSpPr>
           <p:spPr>
             <a:xfrm>
-              <a:off x="4091941" y="3962390"/>
+              <a:off x="3807461" y="3571229"/>
               <a:ext cx="1280158" cy="548642"/>
             </a:xfrm>
             <a:prstGeom prst="rect">
@@ -13053,7 +13054,7 @@
           </p:nvSpPr>
           <p:spPr>
             <a:xfrm>
-              <a:off x="5359399" y="3962390"/>
+              <a:off x="5074919" y="3571229"/>
               <a:ext cx="1386841" cy="548642"/>
             </a:xfrm>
             <a:prstGeom prst="rect">
@@ -13121,8 +13122,8 @@
           </p:nvSpPr>
           <p:spPr>
             <a:xfrm>
-              <a:off x="1775460" y="1661156"/>
-              <a:ext cx="3111500" cy="1889756"/>
+              <a:off x="1457960" y="1686559"/>
+              <a:ext cx="3111500" cy="1600183"/>
             </a:xfrm>
             <a:prstGeom prst="rect">
               <a:avLst/>
@@ -13189,8 +13190,8 @@
           </p:nvSpPr>
           <p:spPr>
             <a:xfrm>
-              <a:off x="4980940" y="1671318"/>
-              <a:ext cx="3025140" cy="1889756"/>
+              <a:off x="4696460" y="1686558"/>
+              <a:ext cx="3025140" cy="1610359"/>
             </a:xfrm>
             <a:prstGeom prst="rect">
               <a:avLst/>
@@ -13248,6 +13249,929 @@
     <p:extLst>
       <p:ext uri="{BB962C8B-B14F-4D97-AF65-F5344CB8AC3E}">
         <p14:creationId xmlns:p14="http://schemas.microsoft.com/office/powerpoint/2010/main" val="200200351"/>
+      </p:ext>
+    </p:extLst>
+  </p:cSld>
+  <p:clrMapOvr>
+    <a:masterClrMapping/>
+  </p:clrMapOvr>
+</p:sld>
+</file>
+
+<file path=ppt/slides/slide5.xml><?xml version="1.0" encoding="utf-8"?>
+<p:sld xmlns:a="http://schemas.openxmlformats.org/drawingml/2006/main" xmlns:r="http://schemas.openxmlformats.org/officeDocument/2006/relationships" xmlns:p="http://schemas.openxmlformats.org/presentationml/2006/main">
+  <p:cSld>
+    <p:spTree>
+      <p:nvGrpSpPr>
+        <p:cNvPr id="1" name=""/>
+        <p:cNvGrpSpPr/>
+        <p:nvPr/>
+      </p:nvGrpSpPr>
+      <p:grpSpPr>
+        <a:xfrm>
+          <a:off x="0" y="0"/>
+          <a:ext cx="0" cy="0"/>
+          <a:chOff x="0" y="0"/>
+          <a:chExt cx="0" cy="0"/>
+        </a:xfrm>
+      </p:grpSpPr>
+      <p:grpSp>
+        <p:nvGrpSpPr>
+          <p:cNvPr id="10" name="组合 9">
+            <a:extLst>
+              <a:ext uri="{FF2B5EF4-FFF2-40B4-BE49-F238E27FC236}">
+                <a16:creationId xmlns:a16="http://schemas.microsoft.com/office/drawing/2014/main" id="{42575251-C876-459D-8DB2-A4D1EAD7024E}"/>
+              </a:ext>
+            </a:extLst>
+          </p:cNvPr>
+          <p:cNvGrpSpPr/>
+          <p:nvPr/>
+        </p:nvGrpSpPr>
+        <p:grpSpPr>
+          <a:xfrm>
+            <a:off x="274320" y="335280"/>
+            <a:ext cx="3718560" cy="2042160"/>
+            <a:chOff x="985520" y="2103120"/>
+            <a:chExt cx="4368800" cy="2372360"/>
+          </a:xfrm>
+        </p:grpSpPr>
+        <p:sp>
+          <p:nvSpPr>
+            <p:cNvPr id="4" name="矩形 3">
+              <a:extLst>
+                <a:ext uri="{FF2B5EF4-FFF2-40B4-BE49-F238E27FC236}">
+                  <a16:creationId xmlns:a16="http://schemas.microsoft.com/office/drawing/2014/main" id="{663BDFA3-2C8C-402F-B696-790479BE338C}"/>
+                </a:ext>
+              </a:extLst>
+            </p:cNvPr>
+            <p:cNvSpPr/>
+            <p:nvPr/>
+          </p:nvSpPr>
+          <p:spPr>
+            <a:xfrm>
+              <a:off x="985520" y="3342640"/>
+              <a:ext cx="4368800" cy="513080"/>
+            </a:xfrm>
+            <a:prstGeom prst="rect">
+              <a:avLst/>
+            </a:prstGeom>
+            <a:solidFill>
+              <a:schemeClr val="accent6">
+                <a:lumMod val="75000"/>
+              </a:schemeClr>
+            </a:solidFill>
+            <a:ln w="19050">
+              <a:solidFill>
+                <a:schemeClr val="tx1"/>
+              </a:solidFill>
+            </a:ln>
+          </p:spPr>
+          <p:style>
+            <a:lnRef idx="2">
+              <a:schemeClr val="accent1">
+                <a:shade val="50000"/>
+              </a:schemeClr>
+            </a:lnRef>
+            <a:fillRef idx="1">
+              <a:schemeClr val="accent1"/>
+            </a:fillRef>
+            <a:effectRef idx="0">
+              <a:schemeClr val="accent1"/>
+            </a:effectRef>
+            <a:fontRef idx="minor">
+              <a:schemeClr val="lt1"/>
+            </a:fontRef>
+          </p:style>
+          <p:txBody>
+            <a:bodyPr rtlCol="0" anchor="ctr"/>
+            <a:lstStyle/>
+            <a:p>
+              <a:pPr algn="ctr"/>
+              <a:r>
+                <a:rPr lang="en-US" altLang="zh-CN" dirty="0">
+                  <a:solidFill>
+                    <a:schemeClr val="tx1"/>
+                  </a:solidFill>
+                  <a:latin typeface="Times New Roman" panose="02020603050405020304" pitchFamily="18" charset="0"/>
+                  <a:cs typeface="Times New Roman" panose="02020603050405020304" pitchFamily="18" charset="0"/>
+                </a:rPr>
+                <a:t>C Runtime API</a:t>
+              </a:r>
+              <a:endParaRPr lang="zh-CN" altLang="en-US" dirty="0">
+                <a:solidFill>
+                  <a:schemeClr val="tx1"/>
+                </a:solidFill>
+                <a:latin typeface="Times New Roman" panose="02020603050405020304" pitchFamily="18" charset="0"/>
+                <a:cs typeface="Times New Roman" panose="02020603050405020304" pitchFamily="18" charset="0"/>
+              </a:endParaRPr>
+            </a:p>
+          </p:txBody>
+        </p:sp>
+        <p:sp>
+          <p:nvSpPr>
+            <p:cNvPr id="5" name="矩形 4">
+              <a:extLst>
+                <a:ext uri="{FF2B5EF4-FFF2-40B4-BE49-F238E27FC236}">
+                  <a16:creationId xmlns:a16="http://schemas.microsoft.com/office/drawing/2014/main" id="{590F1AA9-5CFB-4614-AF9D-994DA22BFCC2}"/>
+                </a:ext>
+              </a:extLst>
+            </p:cNvPr>
+            <p:cNvSpPr/>
+            <p:nvPr/>
+          </p:nvSpPr>
+          <p:spPr>
+            <a:xfrm>
+              <a:off x="985520" y="3962400"/>
+              <a:ext cx="2092960" cy="513080"/>
+            </a:xfrm>
+            <a:prstGeom prst="rect">
+              <a:avLst/>
+            </a:prstGeom>
+            <a:solidFill>
+              <a:schemeClr val="bg2">
+                <a:lumMod val="75000"/>
+              </a:schemeClr>
+            </a:solidFill>
+            <a:ln w="19050">
+              <a:solidFill>
+                <a:schemeClr val="tx1"/>
+              </a:solidFill>
+            </a:ln>
+          </p:spPr>
+          <p:style>
+            <a:lnRef idx="2">
+              <a:schemeClr val="accent1">
+                <a:shade val="50000"/>
+              </a:schemeClr>
+            </a:lnRef>
+            <a:fillRef idx="1">
+              <a:schemeClr val="accent1"/>
+            </a:fillRef>
+            <a:effectRef idx="0">
+              <a:schemeClr val="accent1"/>
+            </a:effectRef>
+            <a:fontRef idx="minor">
+              <a:schemeClr val="lt1"/>
+            </a:fontRef>
+          </p:style>
+          <p:txBody>
+            <a:bodyPr rtlCol="0" anchor="ctr"/>
+            <a:lstStyle/>
+            <a:p>
+              <a:pPr algn="ctr"/>
+              <a:r>
+                <a:rPr lang="en-US" altLang="zh-CN" dirty="0">
+                  <a:solidFill>
+                    <a:schemeClr val="tx1"/>
+                  </a:solidFill>
+                  <a:latin typeface="Times New Roman" panose="02020603050405020304" pitchFamily="18" charset="0"/>
+                  <a:cs typeface="Times New Roman" panose="02020603050405020304" pitchFamily="18" charset="0"/>
+                </a:rPr>
+                <a:t>CUP Device API</a:t>
+              </a:r>
+              <a:endParaRPr lang="zh-CN" altLang="en-US" dirty="0">
+                <a:solidFill>
+                  <a:schemeClr val="tx1"/>
+                </a:solidFill>
+                <a:latin typeface="Times New Roman" panose="02020603050405020304" pitchFamily="18" charset="0"/>
+                <a:cs typeface="Times New Roman" panose="02020603050405020304" pitchFamily="18" charset="0"/>
+              </a:endParaRPr>
+            </a:p>
+          </p:txBody>
+        </p:sp>
+        <p:sp>
+          <p:nvSpPr>
+            <p:cNvPr id="6" name="矩形 5">
+              <a:extLst>
+                <a:ext uri="{FF2B5EF4-FFF2-40B4-BE49-F238E27FC236}">
+                  <a16:creationId xmlns:a16="http://schemas.microsoft.com/office/drawing/2014/main" id="{71B3B87F-C64B-44B5-B7CD-D56DFFFEB770}"/>
+                </a:ext>
+              </a:extLst>
+            </p:cNvPr>
+            <p:cNvSpPr/>
+            <p:nvPr/>
+          </p:nvSpPr>
+          <p:spPr>
+            <a:xfrm>
+              <a:off x="3261360" y="3962400"/>
+              <a:ext cx="2092960" cy="513080"/>
+            </a:xfrm>
+            <a:prstGeom prst="rect">
+              <a:avLst/>
+            </a:prstGeom>
+            <a:solidFill>
+              <a:schemeClr val="bg2">
+                <a:lumMod val="75000"/>
+              </a:schemeClr>
+            </a:solidFill>
+            <a:ln w="19050">
+              <a:solidFill>
+                <a:schemeClr val="tx1"/>
+              </a:solidFill>
+            </a:ln>
+          </p:spPr>
+          <p:style>
+            <a:lnRef idx="2">
+              <a:schemeClr val="accent1">
+                <a:shade val="50000"/>
+              </a:schemeClr>
+            </a:lnRef>
+            <a:fillRef idx="1">
+              <a:schemeClr val="accent1"/>
+            </a:fillRef>
+            <a:effectRef idx="0">
+              <a:schemeClr val="accent1"/>
+            </a:effectRef>
+            <a:fontRef idx="minor">
+              <a:schemeClr val="lt1"/>
+            </a:fontRef>
+          </p:style>
+          <p:txBody>
+            <a:bodyPr rtlCol="0" anchor="ctr"/>
+            <a:lstStyle/>
+            <a:p>
+              <a:pPr algn="ctr"/>
+              <a:r>
+                <a:rPr lang="en-US" altLang="zh-CN" dirty="0">
+                  <a:solidFill>
+                    <a:schemeClr val="tx1"/>
+                  </a:solidFill>
+                  <a:latin typeface="Times New Roman" panose="02020603050405020304" pitchFamily="18" charset="0"/>
+                  <a:cs typeface="Times New Roman" panose="02020603050405020304" pitchFamily="18" charset="0"/>
+                </a:rPr>
+                <a:t>GUP Device API</a:t>
+              </a:r>
+              <a:endParaRPr lang="zh-CN" altLang="en-US" dirty="0">
+                <a:solidFill>
+                  <a:schemeClr val="tx1"/>
+                </a:solidFill>
+                <a:latin typeface="Times New Roman" panose="02020603050405020304" pitchFamily="18" charset="0"/>
+                <a:cs typeface="Times New Roman" panose="02020603050405020304" pitchFamily="18" charset="0"/>
+              </a:endParaRPr>
+            </a:p>
+          </p:txBody>
+        </p:sp>
+        <p:sp>
+          <p:nvSpPr>
+            <p:cNvPr id="7" name="矩形 6">
+              <a:extLst>
+                <a:ext uri="{FF2B5EF4-FFF2-40B4-BE49-F238E27FC236}">
+                  <a16:creationId xmlns:a16="http://schemas.microsoft.com/office/drawing/2014/main" id="{BEEC7C5C-D298-4831-852C-E2B483309CF0}"/>
+                </a:ext>
+              </a:extLst>
+            </p:cNvPr>
+            <p:cNvSpPr/>
+            <p:nvPr/>
+          </p:nvSpPr>
+          <p:spPr>
+            <a:xfrm>
+              <a:off x="985520" y="2722880"/>
+              <a:ext cx="4368800" cy="513080"/>
+            </a:xfrm>
+            <a:prstGeom prst="rect">
+              <a:avLst/>
+            </a:prstGeom>
+            <a:solidFill>
+              <a:schemeClr val="accent1">
+                <a:lumMod val="60000"/>
+                <a:lumOff val="40000"/>
+              </a:schemeClr>
+            </a:solidFill>
+            <a:ln w="19050">
+              <a:solidFill>
+                <a:schemeClr val="tx1"/>
+              </a:solidFill>
+            </a:ln>
+          </p:spPr>
+          <p:style>
+            <a:lnRef idx="2">
+              <a:schemeClr val="accent1">
+                <a:shade val="50000"/>
+              </a:schemeClr>
+            </a:lnRef>
+            <a:fillRef idx="1">
+              <a:schemeClr val="accent1"/>
+            </a:fillRef>
+            <a:effectRef idx="0">
+              <a:schemeClr val="accent1"/>
+            </a:effectRef>
+            <a:fontRef idx="minor">
+              <a:schemeClr val="lt1"/>
+            </a:fontRef>
+          </p:style>
+          <p:txBody>
+            <a:bodyPr rtlCol="0" anchor="ctr"/>
+            <a:lstStyle/>
+            <a:p>
+              <a:pPr algn="ctr"/>
+              <a:r>
+                <a:rPr lang="en-US" altLang="zh-CN" dirty="0">
+                  <a:solidFill>
+                    <a:schemeClr val="tx1"/>
+                  </a:solidFill>
+                  <a:latin typeface="Times New Roman" panose="02020603050405020304" pitchFamily="18" charset="0"/>
+                  <a:cs typeface="Times New Roman" panose="02020603050405020304" pitchFamily="18" charset="0"/>
+                </a:rPr>
+                <a:t>Python API</a:t>
+              </a:r>
+              <a:endParaRPr lang="zh-CN" altLang="en-US" dirty="0">
+                <a:solidFill>
+                  <a:schemeClr val="tx1"/>
+                </a:solidFill>
+                <a:latin typeface="Times New Roman" panose="02020603050405020304" pitchFamily="18" charset="0"/>
+                <a:cs typeface="Times New Roman" panose="02020603050405020304" pitchFamily="18" charset="0"/>
+              </a:endParaRPr>
+            </a:p>
+          </p:txBody>
+        </p:sp>
+        <p:sp>
+          <p:nvSpPr>
+            <p:cNvPr id="8" name="矩形 7">
+              <a:extLst>
+                <a:ext uri="{FF2B5EF4-FFF2-40B4-BE49-F238E27FC236}">
+                  <a16:creationId xmlns:a16="http://schemas.microsoft.com/office/drawing/2014/main" id="{F82E635E-A430-4FE7-9FA3-773BC4BF3578}"/>
+                </a:ext>
+              </a:extLst>
+            </p:cNvPr>
+            <p:cNvSpPr/>
+            <p:nvPr/>
+          </p:nvSpPr>
+          <p:spPr>
+            <a:xfrm>
+              <a:off x="985520" y="2103120"/>
+              <a:ext cx="4368800" cy="513080"/>
+            </a:xfrm>
+            <a:prstGeom prst="rect">
+              <a:avLst/>
+            </a:prstGeom>
+            <a:solidFill>
+              <a:schemeClr val="accent4">
+                <a:lumMod val="60000"/>
+                <a:lumOff val="40000"/>
+              </a:schemeClr>
+            </a:solidFill>
+            <a:ln w="19050">
+              <a:solidFill>
+                <a:schemeClr val="tx1"/>
+              </a:solidFill>
+            </a:ln>
+          </p:spPr>
+          <p:style>
+            <a:lnRef idx="2">
+              <a:schemeClr val="accent1">
+                <a:shade val="50000"/>
+              </a:schemeClr>
+            </a:lnRef>
+            <a:fillRef idx="1">
+              <a:schemeClr val="accent1"/>
+            </a:fillRef>
+            <a:effectRef idx="0">
+              <a:schemeClr val="accent1"/>
+            </a:effectRef>
+            <a:fontRef idx="minor">
+              <a:schemeClr val="lt1"/>
+            </a:fontRef>
+          </p:style>
+          <p:txBody>
+            <a:bodyPr rtlCol="0" anchor="ctr"/>
+            <a:lstStyle/>
+            <a:p>
+              <a:pPr algn="ctr"/>
+              <a:r>
+                <a:rPr lang="en-US" altLang="zh-CN" dirty="0">
+                  <a:solidFill>
+                    <a:schemeClr val="tx1"/>
+                  </a:solidFill>
+                  <a:latin typeface="Times New Roman" panose="02020603050405020304" pitchFamily="18" charset="0"/>
+                  <a:cs typeface="Times New Roman" panose="02020603050405020304" pitchFamily="18" charset="0"/>
+                </a:rPr>
+                <a:t>Automatic Differentiation</a:t>
+              </a:r>
+              <a:endParaRPr lang="zh-CN" altLang="en-US" dirty="0">
+                <a:solidFill>
+                  <a:schemeClr val="tx1"/>
+                </a:solidFill>
+                <a:latin typeface="Times New Roman" panose="02020603050405020304" pitchFamily="18" charset="0"/>
+                <a:cs typeface="Times New Roman" panose="02020603050405020304" pitchFamily="18" charset="0"/>
+              </a:endParaRPr>
+            </a:p>
+          </p:txBody>
+        </p:sp>
+      </p:grpSp>
+      <p:grpSp>
+        <p:nvGrpSpPr>
+          <p:cNvPr id="13" name="组合 12">
+            <a:extLst>
+              <a:ext uri="{FF2B5EF4-FFF2-40B4-BE49-F238E27FC236}">
+                <a16:creationId xmlns:a16="http://schemas.microsoft.com/office/drawing/2014/main" id="{C76721EC-C232-4542-A762-24F78766BE3B}"/>
+              </a:ext>
+            </a:extLst>
+          </p:cNvPr>
+          <p:cNvGrpSpPr/>
+          <p:nvPr/>
+        </p:nvGrpSpPr>
+        <p:grpSpPr>
+          <a:xfrm>
+            <a:off x="3368040" y="4845813"/>
+            <a:ext cx="4507832" cy="442369"/>
+            <a:chOff x="3368040" y="4845813"/>
+            <a:chExt cx="4507832" cy="442369"/>
+          </a:xfrm>
+        </p:grpSpPr>
+        <p:sp>
+          <p:nvSpPr>
+            <p:cNvPr id="2" name="矩形 1">
+              <a:extLst>
+                <a:ext uri="{FF2B5EF4-FFF2-40B4-BE49-F238E27FC236}">
+                  <a16:creationId xmlns:a16="http://schemas.microsoft.com/office/drawing/2014/main" id="{C1CFBFA3-4C7D-4D7A-A657-BED25F948BE8}"/>
+                </a:ext>
+              </a:extLst>
+            </p:cNvPr>
+            <p:cNvSpPr/>
+            <p:nvPr/>
+          </p:nvSpPr>
+          <p:spPr>
+            <a:xfrm>
+              <a:off x="3368040" y="4846516"/>
+              <a:ext cx="1126958" cy="441666"/>
+            </a:xfrm>
+            <a:prstGeom prst="rect">
+              <a:avLst/>
+            </a:prstGeom>
+            <a:ln>
+              <a:solidFill>
+                <a:schemeClr val="tx1"/>
+              </a:solidFill>
+            </a:ln>
+          </p:spPr>
+          <p:style>
+            <a:lnRef idx="2">
+              <a:schemeClr val="accent1">
+                <a:shade val="50000"/>
+              </a:schemeClr>
+            </a:lnRef>
+            <a:fillRef idx="1">
+              <a:schemeClr val="accent1"/>
+            </a:fillRef>
+            <a:effectRef idx="0">
+              <a:schemeClr val="accent1"/>
+            </a:effectRef>
+            <a:fontRef idx="minor">
+              <a:schemeClr val="lt1"/>
+            </a:fontRef>
+          </p:style>
+          <p:txBody>
+            <a:bodyPr rtlCol="0" anchor="ctr"/>
+            <a:lstStyle/>
+            <a:p>
+              <a:pPr algn="ctr"/>
+              <a:r>
+                <a:rPr lang="en-US" altLang="zh-CN" dirty="0">
+                  <a:solidFill>
+                    <a:schemeClr val="tx1"/>
+                  </a:solidFill>
+                  <a:latin typeface="Times New Roman" panose="02020603050405020304" pitchFamily="18" charset="0"/>
+                  <a:cs typeface="Times New Roman" panose="02020603050405020304" pitchFamily="18" charset="0"/>
+                </a:rPr>
+                <a:t>block1</a:t>
+              </a:r>
+              <a:endParaRPr lang="zh-CN" altLang="en-US" dirty="0">
+                <a:solidFill>
+                  <a:schemeClr val="tx1"/>
+                </a:solidFill>
+                <a:latin typeface="Times New Roman" panose="02020603050405020304" pitchFamily="18" charset="0"/>
+                <a:cs typeface="Times New Roman" panose="02020603050405020304" pitchFamily="18" charset="0"/>
+              </a:endParaRPr>
+            </a:p>
+          </p:txBody>
+        </p:sp>
+        <p:sp>
+          <p:nvSpPr>
+            <p:cNvPr id="9" name="矩形 8">
+              <a:extLst>
+                <a:ext uri="{FF2B5EF4-FFF2-40B4-BE49-F238E27FC236}">
+                  <a16:creationId xmlns:a16="http://schemas.microsoft.com/office/drawing/2014/main" id="{003958A7-4592-4616-9C33-AB129A90FD4F}"/>
+                </a:ext>
+              </a:extLst>
+            </p:cNvPr>
+            <p:cNvSpPr/>
+            <p:nvPr/>
+          </p:nvSpPr>
+          <p:spPr>
+            <a:xfrm>
+              <a:off x="4494998" y="4845813"/>
+              <a:ext cx="1126958" cy="441666"/>
+            </a:xfrm>
+            <a:prstGeom prst="rect">
+              <a:avLst/>
+            </a:prstGeom>
+            <a:ln>
+              <a:solidFill>
+                <a:schemeClr val="tx1"/>
+              </a:solidFill>
+            </a:ln>
+          </p:spPr>
+          <p:style>
+            <a:lnRef idx="2">
+              <a:schemeClr val="accent1">
+                <a:shade val="50000"/>
+              </a:schemeClr>
+            </a:lnRef>
+            <a:fillRef idx="1">
+              <a:schemeClr val="accent1"/>
+            </a:fillRef>
+            <a:effectRef idx="0">
+              <a:schemeClr val="accent1"/>
+            </a:effectRef>
+            <a:fontRef idx="minor">
+              <a:schemeClr val="lt1"/>
+            </a:fontRef>
+          </p:style>
+          <p:txBody>
+            <a:bodyPr rtlCol="0" anchor="ctr"/>
+            <a:lstStyle/>
+            <a:p>
+              <a:pPr algn="ctr"/>
+              <a:r>
+                <a:rPr lang="en-US" altLang="zh-CN" dirty="0">
+                  <a:solidFill>
+                    <a:schemeClr val="tx1"/>
+                  </a:solidFill>
+                  <a:latin typeface="Times New Roman" panose="02020603050405020304" pitchFamily="18" charset="0"/>
+                  <a:cs typeface="Times New Roman" panose="02020603050405020304" pitchFamily="18" charset="0"/>
+                </a:rPr>
+                <a:t>block2</a:t>
+              </a:r>
+              <a:endParaRPr lang="zh-CN" altLang="en-US" dirty="0">
+                <a:solidFill>
+                  <a:schemeClr val="tx1"/>
+                </a:solidFill>
+                <a:latin typeface="Times New Roman" panose="02020603050405020304" pitchFamily="18" charset="0"/>
+                <a:cs typeface="Times New Roman" panose="02020603050405020304" pitchFamily="18" charset="0"/>
+              </a:endParaRPr>
+            </a:p>
+          </p:txBody>
+        </p:sp>
+        <p:sp>
+          <p:nvSpPr>
+            <p:cNvPr id="11" name="矩形 10">
+              <a:extLst>
+                <a:ext uri="{FF2B5EF4-FFF2-40B4-BE49-F238E27FC236}">
+                  <a16:creationId xmlns:a16="http://schemas.microsoft.com/office/drawing/2014/main" id="{A82FA5B1-06EE-4BC3-91BC-D602EF1310F6}"/>
+                </a:ext>
+              </a:extLst>
+            </p:cNvPr>
+            <p:cNvSpPr/>
+            <p:nvPr/>
+          </p:nvSpPr>
+          <p:spPr>
+            <a:xfrm>
+              <a:off x="5621956" y="4845813"/>
+              <a:ext cx="1126958" cy="441666"/>
+            </a:xfrm>
+            <a:prstGeom prst="rect">
+              <a:avLst/>
+            </a:prstGeom>
+            <a:ln>
+              <a:solidFill>
+                <a:schemeClr val="tx1"/>
+              </a:solidFill>
+            </a:ln>
+          </p:spPr>
+          <p:style>
+            <a:lnRef idx="2">
+              <a:schemeClr val="accent1">
+                <a:shade val="50000"/>
+              </a:schemeClr>
+            </a:lnRef>
+            <a:fillRef idx="1">
+              <a:schemeClr val="accent1"/>
+            </a:fillRef>
+            <a:effectRef idx="0">
+              <a:schemeClr val="accent1"/>
+            </a:effectRef>
+            <a:fontRef idx="minor">
+              <a:schemeClr val="lt1"/>
+            </a:fontRef>
+          </p:style>
+          <p:txBody>
+            <a:bodyPr rtlCol="0" anchor="ctr"/>
+            <a:lstStyle/>
+            <a:p>
+              <a:pPr algn="ctr"/>
+              <a:r>
+                <a:rPr lang="en-US" altLang="zh-CN" dirty="0">
+                  <a:solidFill>
+                    <a:schemeClr val="tx1"/>
+                  </a:solidFill>
+                  <a:latin typeface="Times New Roman" panose="02020603050405020304" pitchFamily="18" charset="0"/>
+                  <a:cs typeface="Times New Roman" panose="02020603050405020304" pitchFamily="18" charset="0"/>
+                </a:rPr>
+                <a:t>…</a:t>
+              </a:r>
+              <a:endParaRPr lang="zh-CN" altLang="en-US" dirty="0">
+                <a:solidFill>
+                  <a:schemeClr val="tx1"/>
+                </a:solidFill>
+                <a:latin typeface="Times New Roman" panose="02020603050405020304" pitchFamily="18" charset="0"/>
+                <a:cs typeface="Times New Roman" panose="02020603050405020304" pitchFamily="18" charset="0"/>
+              </a:endParaRPr>
+            </a:p>
+          </p:txBody>
+        </p:sp>
+        <p:sp>
+          <p:nvSpPr>
+            <p:cNvPr id="12" name="矩形 11">
+              <a:extLst>
+                <a:ext uri="{FF2B5EF4-FFF2-40B4-BE49-F238E27FC236}">
+                  <a16:creationId xmlns:a16="http://schemas.microsoft.com/office/drawing/2014/main" id="{BF19D1DD-66B8-4D92-A6A8-F1CBF48584BE}"/>
+                </a:ext>
+              </a:extLst>
+            </p:cNvPr>
+            <p:cNvSpPr/>
+            <p:nvPr/>
+          </p:nvSpPr>
+          <p:spPr>
+            <a:xfrm>
+              <a:off x="6748914" y="4845813"/>
+              <a:ext cx="1126958" cy="441666"/>
+            </a:xfrm>
+            <a:prstGeom prst="rect">
+              <a:avLst/>
+            </a:prstGeom>
+            <a:ln>
+              <a:solidFill>
+                <a:schemeClr val="tx1"/>
+              </a:solidFill>
+            </a:ln>
+          </p:spPr>
+          <p:style>
+            <a:lnRef idx="2">
+              <a:schemeClr val="accent1">
+                <a:shade val="50000"/>
+              </a:schemeClr>
+            </a:lnRef>
+            <a:fillRef idx="1">
+              <a:schemeClr val="accent1"/>
+            </a:fillRef>
+            <a:effectRef idx="0">
+              <a:schemeClr val="accent1"/>
+            </a:effectRef>
+            <a:fontRef idx="minor">
+              <a:schemeClr val="lt1"/>
+            </a:fontRef>
+          </p:style>
+          <p:txBody>
+            <a:bodyPr rtlCol="0" anchor="ctr"/>
+            <a:lstStyle/>
+            <a:p>
+              <a:pPr algn="ctr"/>
+              <a:r>
+                <a:rPr lang="en-US" altLang="zh-CN" dirty="0" err="1">
+                  <a:solidFill>
+                    <a:schemeClr val="tx1"/>
+                  </a:solidFill>
+                  <a:latin typeface="Times New Roman" panose="02020603050405020304" pitchFamily="18" charset="0"/>
+                  <a:cs typeface="Times New Roman" panose="02020603050405020304" pitchFamily="18" charset="0"/>
+                </a:rPr>
+                <a:t>blockN</a:t>
+              </a:r>
+              <a:endParaRPr lang="zh-CN" altLang="en-US" dirty="0">
+                <a:solidFill>
+                  <a:schemeClr val="tx1"/>
+                </a:solidFill>
+                <a:latin typeface="Times New Roman" panose="02020603050405020304" pitchFamily="18" charset="0"/>
+                <a:cs typeface="Times New Roman" panose="02020603050405020304" pitchFamily="18" charset="0"/>
+              </a:endParaRPr>
+            </a:p>
+          </p:txBody>
+        </p:sp>
+      </p:grpSp>
+      <p:sp>
+        <p:nvSpPr>
+          <p:cNvPr id="3" name="矩形 2">
+            <a:extLst>
+              <a:ext uri="{FF2B5EF4-FFF2-40B4-BE49-F238E27FC236}">
+                <a16:creationId xmlns:a16="http://schemas.microsoft.com/office/drawing/2014/main" id="{6554824D-3513-4B97-B409-702D7976CAFF}"/>
+              </a:ext>
+            </a:extLst>
+          </p:cNvPr>
+          <p:cNvSpPr/>
+          <p:nvPr/>
+        </p:nvSpPr>
+        <p:spPr>
+          <a:xfrm>
+            <a:off x="3368040" y="3246022"/>
+            <a:ext cx="7662334" cy="441666"/>
+          </a:xfrm>
+          <a:prstGeom prst="rect">
+            <a:avLst/>
+          </a:prstGeom>
+          <a:solidFill>
+            <a:schemeClr val="accent4">
+              <a:lumMod val="60000"/>
+              <a:lumOff val="40000"/>
+            </a:schemeClr>
+          </a:solidFill>
+        </p:spPr>
+        <p:style>
+          <a:lnRef idx="2">
+            <a:schemeClr val="accent1">
+              <a:shade val="50000"/>
+            </a:schemeClr>
+          </a:lnRef>
+          <a:fillRef idx="1">
+            <a:schemeClr val="accent1"/>
+          </a:fillRef>
+          <a:effectRef idx="0">
+            <a:schemeClr val="accent1"/>
+          </a:effectRef>
+          <a:fontRef idx="minor">
+            <a:schemeClr val="lt1"/>
+          </a:fontRef>
+        </p:style>
+        <p:txBody>
+          <a:bodyPr rtlCol="0" anchor="ctr"/>
+          <a:lstStyle/>
+          <a:p>
+            <a:pPr algn="ctr"/>
+            <a:endParaRPr lang="zh-CN" altLang="en-US"/>
+          </a:p>
+        </p:txBody>
+      </p:sp>
+      <p:cxnSp>
+        <p:nvCxnSpPr>
+          <p:cNvPr id="20" name="直接箭头连接符 19">
+            <a:extLst>
+              <a:ext uri="{FF2B5EF4-FFF2-40B4-BE49-F238E27FC236}">
+                <a16:creationId xmlns:a16="http://schemas.microsoft.com/office/drawing/2014/main" id="{CC8771E0-A529-4698-A38B-47916A29EAEB}"/>
+              </a:ext>
+            </a:extLst>
+          </p:cNvPr>
+          <p:cNvCxnSpPr>
+            <a:cxnSpLocks/>
+            <a:stCxn id="3" idx="1"/>
+          </p:cNvCxnSpPr>
+          <p:nvPr/>
+        </p:nvCxnSpPr>
+        <p:spPr>
+          <a:xfrm>
+            <a:off x="3368040" y="3466855"/>
+            <a:ext cx="0" cy="1378958"/>
+          </a:xfrm>
+          <a:prstGeom prst="straightConnector1">
+            <a:avLst/>
+          </a:prstGeom>
+          <a:ln>
+            <a:tailEnd type="triangle"/>
+          </a:ln>
+        </p:spPr>
+        <p:style>
+          <a:lnRef idx="3">
+            <a:schemeClr val="dk1"/>
+          </a:lnRef>
+          <a:fillRef idx="0">
+            <a:schemeClr val="dk1"/>
+          </a:fillRef>
+          <a:effectRef idx="2">
+            <a:schemeClr val="dk1"/>
+          </a:effectRef>
+          <a:fontRef idx="minor">
+            <a:schemeClr val="tx1"/>
+          </a:fontRef>
+        </p:style>
+      </p:cxnSp>
+      <p:cxnSp>
+        <p:nvCxnSpPr>
+          <p:cNvPr id="22" name="直接箭头连接符 21">
+            <a:extLst>
+              <a:ext uri="{FF2B5EF4-FFF2-40B4-BE49-F238E27FC236}">
+                <a16:creationId xmlns:a16="http://schemas.microsoft.com/office/drawing/2014/main" id="{9D48847F-AC77-4D82-8D49-CA0ABB753040}"/>
+              </a:ext>
+            </a:extLst>
+          </p:cNvPr>
+          <p:cNvCxnSpPr>
+            <a:cxnSpLocks/>
+          </p:cNvCxnSpPr>
+          <p:nvPr/>
+        </p:nvCxnSpPr>
+        <p:spPr>
+          <a:xfrm>
+            <a:off x="7875872" y="3687688"/>
+            <a:ext cx="0" cy="1158125"/>
+          </a:xfrm>
+          <a:prstGeom prst="straightConnector1">
+            <a:avLst/>
+          </a:prstGeom>
+          <a:ln>
+            <a:tailEnd type="triangle"/>
+          </a:ln>
+        </p:spPr>
+        <p:style>
+          <a:lnRef idx="3">
+            <a:schemeClr val="dk1"/>
+          </a:lnRef>
+          <a:fillRef idx="0">
+            <a:schemeClr val="dk1"/>
+          </a:fillRef>
+          <a:effectRef idx="2">
+            <a:schemeClr val="dk1"/>
+          </a:effectRef>
+          <a:fontRef idx="minor">
+            <a:schemeClr val="tx1"/>
+          </a:fontRef>
+        </p:style>
+      </p:cxnSp>
+      <p:cxnSp>
+        <p:nvCxnSpPr>
+          <p:cNvPr id="26" name="直接箭头连接符 25">
+            <a:extLst>
+              <a:ext uri="{FF2B5EF4-FFF2-40B4-BE49-F238E27FC236}">
+                <a16:creationId xmlns:a16="http://schemas.microsoft.com/office/drawing/2014/main" id="{80C06FFC-E61D-4128-8A00-932A7289A039}"/>
+              </a:ext>
+            </a:extLst>
+          </p:cNvPr>
+          <p:cNvCxnSpPr/>
+          <p:nvPr/>
+        </p:nvCxnSpPr>
+        <p:spPr>
+          <a:xfrm flipH="1">
+            <a:off x="3368040" y="3687688"/>
+            <a:ext cx="4507832" cy="1158125"/>
+          </a:xfrm>
+          <a:prstGeom prst="straightConnector1">
+            <a:avLst/>
+          </a:prstGeom>
+          <a:ln>
+            <a:solidFill>
+              <a:srgbClr val="FF0000"/>
+            </a:solidFill>
+            <a:tailEnd type="triangle"/>
+          </a:ln>
+        </p:spPr>
+        <p:style>
+          <a:lnRef idx="3">
+            <a:schemeClr val="dk1"/>
+          </a:lnRef>
+          <a:fillRef idx="0">
+            <a:schemeClr val="dk1"/>
+          </a:fillRef>
+          <a:effectRef idx="2">
+            <a:schemeClr val="dk1"/>
+          </a:effectRef>
+          <a:fontRef idx="minor">
+            <a:schemeClr val="tx1"/>
+          </a:fontRef>
+        </p:style>
+      </p:cxnSp>
+      <p:cxnSp>
+        <p:nvCxnSpPr>
+          <p:cNvPr id="28" name="直接箭头连接符 27">
+            <a:extLst>
+              <a:ext uri="{FF2B5EF4-FFF2-40B4-BE49-F238E27FC236}">
+                <a16:creationId xmlns:a16="http://schemas.microsoft.com/office/drawing/2014/main" id="{8A627588-56B5-41E5-AA1F-3738041A1ACA}"/>
+              </a:ext>
+            </a:extLst>
+          </p:cNvPr>
+          <p:cNvCxnSpPr>
+            <a:endCxn id="12" idx="0"/>
+          </p:cNvCxnSpPr>
+          <p:nvPr/>
+        </p:nvCxnSpPr>
+        <p:spPr>
+          <a:xfrm flipH="1">
+            <a:off x="7312393" y="3687688"/>
+            <a:ext cx="3717981" cy="1158125"/>
+          </a:xfrm>
+          <a:prstGeom prst="straightConnector1">
+            <a:avLst/>
+          </a:prstGeom>
+          <a:ln>
+            <a:solidFill>
+              <a:srgbClr val="FF0000"/>
+            </a:solidFill>
+            <a:tailEnd type="triangle"/>
+          </a:ln>
+        </p:spPr>
+        <p:style>
+          <a:lnRef idx="3">
+            <a:schemeClr val="dk1"/>
+          </a:lnRef>
+          <a:fillRef idx="0">
+            <a:schemeClr val="dk1"/>
+          </a:fillRef>
+          <a:effectRef idx="2">
+            <a:schemeClr val="dk1"/>
+          </a:effectRef>
+          <a:fontRef idx="minor">
+            <a:schemeClr val="tx1"/>
+          </a:fontRef>
+        </p:style>
+      </p:cxnSp>
+    </p:spTree>
+    <p:extLst>
+      <p:ext uri="{BB962C8B-B14F-4D97-AF65-F5344CB8AC3E}">
+        <p14:creationId xmlns:p14="http://schemas.microsoft.com/office/powerpoint/2010/main" val="3770466636"/>
       </p:ext>
     </p:extLst>
   </p:cSld>

</xml_diff>